<commit_message>
abstract info from d2l
</commit_message>
<xml_diff>
--- a/Poster Template.pptx
+++ b/Poster Template.pptx
@@ -5,27 +5,28 @@
     <p:sldMasterId id="2147483648" r:id="rId1"/>
   </p:sldMasterIdLst>
   <p:notesMasterIdLst>
-    <p:notesMasterId r:id="rId3"/>
+    <p:notesMasterId r:id="rId4"/>
   </p:notesMasterIdLst>
   <p:sldIdLst>
     <p:sldId id="256" r:id="rId2"/>
+    <p:sldId id="257" r:id="rId3"/>
   </p:sldIdLst>
   <p:sldSz cx="43891200" cy="32918400"/>
   <p:notesSz cx="9094788" cy="13573125"/>
   <p:embeddedFontLst>
     <p:embeddedFont>
       <p:font typeface="Gill Sans MT" panose="020B0502020104020203" pitchFamily="34" charset="0"/>
-      <p:regular r:id="rId4"/>
-      <p:bold r:id="rId5"/>
-      <p:italic r:id="rId6"/>
-      <p:boldItalic r:id="rId7"/>
+      <p:regular r:id="rId5"/>
+      <p:bold r:id="rId6"/>
+      <p:italic r:id="rId7"/>
+      <p:boldItalic r:id="rId8"/>
     </p:embeddedFont>
     <p:embeddedFont>
       <p:font typeface="Calibri" panose="020F0502020204030204" pitchFamily="34" charset="0"/>
-      <p:regular r:id="rId8"/>
-      <p:bold r:id="rId9"/>
-      <p:italic r:id="rId10"/>
-      <p:boldItalic r:id="rId11"/>
+      <p:regular r:id="rId9"/>
+      <p:bold r:id="rId10"/>
+      <p:italic r:id="rId11"/>
+      <p:boldItalic r:id="rId12"/>
     </p:embeddedFont>
   </p:embeddedFontLst>
   <p:defaultTextStyle>
@@ -155,7 +156,7 @@
   </p:defaultTextStyle>
   <p:extLst>
     <p:ext uri="{EFAFB233-063F-42B5-8137-9DF3F51BA10A}">
-      <p15:sldGuideLst xmlns="" xmlns:p15="http://schemas.microsoft.com/office/powerpoint/2012/main">
+      <p15:sldGuideLst xmlns:p15="http://schemas.microsoft.com/office/powerpoint/2012/main">
         <p15:guide id="1" orient="horz" pos="10368" userDrawn="1">
           <p15:clr>
             <a:srgbClr val="A4A3A4"/>
@@ -4913,15 +4914,7 @@
             <a:pPr eaLnBrk="1" hangingPunct="1"/>
             <a:r>
               <a:rPr lang="en-US" sz="3600" dirty="0" smtClean="0"/>
-              <a:t>The original implementation of the spaceship behavior was rudimentary and unnatural.  The application of the bridge pattern allowed </a:t>
-            </a:r>
-            <a:r>
-              <a:rPr lang="en-US" sz="3600" dirty="0" smtClean="0"/>
-              <a:t> for enhancement </a:t>
-            </a:r>
-            <a:r>
-              <a:rPr lang="en-US" sz="3600" dirty="0" smtClean="0"/>
-              <a:t>of the motion of the spaceship with minimal </a:t>
+              <a:t>The original implementation of the spaceship behavior was rudimentary and unnatural.  The application of the bridge pattern allowed  for enhancement of the motion of the spaceship with minimal </a:t>
             </a:r>
           </a:p>
         </p:txBody>
@@ -6637,11 +6630,7 @@
             </a:pPr>
             <a:r>
               <a:rPr lang="en-US" sz="3600" dirty="0" smtClean="0"/>
-              <a:t>The result of the implementation of the Newtonian behavior using the </a:t>
-            </a:r>
-            <a:r>
-              <a:rPr lang="en-US" sz="3600" dirty="0" smtClean="0"/>
-              <a:t>structural bridge pattern has the following benefits:</a:t>
+              <a:t>The result of the implementation of the Newtonian behavior using the structural bridge pattern has the following benefits:</a:t>
             </a:r>
           </a:p>
           <a:p>
@@ -6657,15 +6646,7 @@
             </a:pPr>
             <a:r>
               <a:rPr lang="en-US" sz="3600" dirty="0" smtClean="0"/>
-              <a:t>Natural </a:t>
-            </a:r>
-            <a:r>
-              <a:rPr lang="en-US" sz="3600" dirty="0" smtClean="0"/>
-              <a:t>and challenging game </a:t>
-            </a:r>
-            <a:r>
-              <a:rPr lang="en-US" sz="3600" dirty="0" smtClean="0"/>
-              <a:t>play. </a:t>
+              <a:t>Natural and challenging game play. </a:t>
             </a:r>
           </a:p>
           <a:p>
@@ -6681,15 +6662,7 @@
             </a:pPr>
             <a:r>
               <a:rPr lang="en-US" sz="3600" dirty="0" smtClean="0"/>
-              <a:t>Option </a:t>
-            </a:r>
-            <a:r>
-              <a:rPr lang="en-US" sz="3600" dirty="0" smtClean="0"/>
-              <a:t>of </a:t>
-            </a:r>
-            <a:r>
-              <a:rPr lang="en-US" sz="3600" dirty="0" smtClean="0"/>
-              <a:t>implementing additional behaviors.</a:t>
+              <a:t>Option of implementing additional behaviors.</a:t>
             </a:r>
           </a:p>
           <a:p>
@@ -6707,7 +6680,6 @@
               <a:rPr lang="en-US" sz="3600" dirty="0" smtClean="0"/>
               <a:t>Behavior is open for extension and closed for modification.</a:t>
             </a:r>
-            <a:endParaRPr lang="en-US" sz="3600" dirty="0" smtClean="0"/>
           </a:p>
         </p:txBody>
       </p:sp>
@@ -8672,6 +8644,142 @@
       </p:par>
     </p:tnLst>
   </p:timing>
+</p:sld>
+</file>
+
+<file path=ppt/slides/slide2.xml><?xml version="1.0" encoding="utf-8"?>
+<p:sld xmlns:a="http://schemas.openxmlformats.org/drawingml/2006/main" xmlns:r="http://schemas.openxmlformats.org/officeDocument/2006/relationships" xmlns:p="http://schemas.openxmlformats.org/presentationml/2006/main">
+  <p:cSld>
+    <p:spTree>
+      <p:nvGrpSpPr>
+        <p:cNvPr id="1" name=""/>
+        <p:cNvGrpSpPr/>
+        <p:nvPr/>
+      </p:nvGrpSpPr>
+      <p:grpSpPr>
+        <a:xfrm>
+          <a:off x="0" y="0"/>
+          <a:ext cx="0" cy="0"/>
+          <a:chOff x="0" y="0"/>
+          <a:chExt cx="0" cy="0"/>
+        </a:xfrm>
+      </p:grpSpPr>
+      <p:sp>
+        <p:nvSpPr>
+          <p:cNvPr id="2" name="Title 1"/>
+          <p:cNvSpPr>
+            <a:spLocks noGrp="1"/>
+          </p:cNvSpPr>
+          <p:nvPr>
+            <p:ph type="title"/>
+          </p:nvPr>
+        </p:nvSpPr>
+        <p:spPr/>
+        <p:txBody>
+          <a:bodyPr/>
+          <a:lstStyle/>
+          <a:p>
+            <a:endParaRPr lang="en-US"/>
+          </a:p>
+        </p:txBody>
+      </p:sp>
+      <p:sp>
+        <p:nvSpPr>
+          <p:cNvPr id="3" name="Content Placeholder 2"/>
+          <p:cNvSpPr>
+            <a:spLocks noGrp="1"/>
+          </p:cNvSpPr>
+          <p:nvPr>
+            <p:ph idx="1"/>
+          </p:nvPr>
+        </p:nvSpPr>
+        <p:spPr/>
+        <p:txBody>
+          <a:bodyPr/>
+          <a:lstStyle/>
+          <a:p>
+            <a:r>
+              <a:rPr lang="en-US" sz="6000" dirty="0"/>
+              <a:t>Q: </a:t>
+            </a:r>
+          </a:p>
+          <a:p>
+            <a:r>
+              <a:rPr lang="en-US" sz="6000" dirty="0"/>
+              <a:t>I just wanted to verify that the poster itself only has to cover </a:t>
+            </a:r>
+            <a:r>
+              <a:rPr lang="en-US" sz="6000" u="sng" dirty="0"/>
+              <a:t>one</a:t>
+            </a:r>
+            <a:r>
+              <a:rPr lang="en-US" sz="6000" dirty="0"/>
+              <a:t> </a:t>
+            </a:r>
+            <a:r>
+              <a:rPr lang="en-US" sz="6000" u="sng" dirty="0"/>
+              <a:t>major</a:t>
+            </a:r>
+            <a:r>
+              <a:rPr lang="en-US" sz="6000" dirty="0"/>
+              <a:t> technical aspect of my groups application. One thing my group is considering is the </a:t>
+            </a:r>
+            <a:r>
+              <a:rPr lang="en-US" sz="6000" dirty="0" err="1"/>
+              <a:t>Wifi</a:t>
+            </a:r>
+            <a:r>
+              <a:rPr lang="en-US" sz="6000" dirty="0"/>
+              <a:t> P2P section of the application. While this is very technical, not every person </a:t>
+            </a:r>
+            <a:r>
+              <a:rPr lang="en-US" sz="6000" dirty="0" err="1"/>
+              <a:t>person</a:t>
+            </a:r>
+            <a:r>
+              <a:rPr lang="en-US" sz="6000" dirty="0"/>
+              <a:t> worked on this particular aspect.</a:t>
+            </a:r>
+          </a:p>
+          <a:p>
+            <a:r>
+              <a:rPr lang="en-US" sz="6000" dirty="0"/>
+              <a:t>So, is it fine if the poster covers just one big technical aspect or should it contain a technical contribution from each member?</a:t>
+            </a:r>
+          </a:p>
+          <a:p>
+            <a:r>
+              <a:rPr lang="en-US" sz="6000" dirty="0"/>
+              <a:t>A:</a:t>
+            </a:r>
+          </a:p>
+          <a:p>
+            <a:r>
+              <a:rPr lang="en-US" sz="6000" dirty="0"/>
+              <a:t>The poster needs not include each member's contribution. In the limited space, include the most important things the TEAM has accomplished. Thus, some member's work may not be included at all. In other words, if the team regards WIFI P2P is a major achievement, it must be included in the poster.</a:t>
+            </a:r>
+          </a:p>
+          <a:p>
+            <a:r>
+              <a:rPr lang="en-US" sz="6000" dirty="0"/>
+              <a:t>However, in the Research Abstract, since there is no space limit, every achievement from every member can be included.</a:t>
+            </a:r>
+          </a:p>
+          <a:p>
+            <a:endParaRPr lang="en-US" sz="6000" dirty="0"/>
+          </a:p>
+        </p:txBody>
+      </p:sp>
+    </p:spTree>
+    <p:extLst>
+      <p:ext uri="{BB962C8B-B14F-4D97-AF65-F5344CB8AC3E}">
+        <p14:creationId xmlns:p14="http://schemas.microsoft.com/office/powerpoint/2010/main" val="3679264860"/>
+      </p:ext>
+    </p:extLst>
+  </p:cSld>
+  <p:clrMapOvr>
+    <a:masterClrMapping/>
+  </p:clrMapOvr>
 </p:sld>
 </file>
 

</xml_diff>